<commit_message>
new version of preso
</commit_message>
<xml_diff>
--- a/FidLin_Presentation4.0.pptx
+++ b/FidLin_Presentation4.0.pptx
@@ -5,7 +5,7 @@
     <p:sldMasterId id="2147483648" r:id="rId1"/>
   </p:sldMasterIdLst>
   <p:notesMasterIdLst>
-    <p:notesMasterId r:id="rId16"/>
+    <p:notesMasterId r:id="rId17"/>
   </p:notesMasterIdLst>
   <p:sldIdLst>
     <p:sldId id="256" r:id="rId2"/>
@@ -20,8 +20,9 @@
     <p:sldId id="269" r:id="rId11"/>
     <p:sldId id="275" r:id="rId12"/>
     <p:sldId id="270" r:id="rId13"/>
-    <p:sldId id="272" r:id="rId14"/>
-    <p:sldId id="278" r:id="rId15"/>
+    <p:sldId id="279" r:id="rId14"/>
+    <p:sldId id="272" r:id="rId15"/>
+    <p:sldId id="278" r:id="rId16"/>
   </p:sldIdLst>
   <p:sldSz cx="12192000" cy="6858000"/>
   <p:notesSz cx="6858000" cy="9144000"/>
@@ -772,7 +773,7 @@
           </a:ln>
           <a:extLst>
             <a:ext uri="{C572A759-6A51-4108-AA02-DFA0A04FC94B}">
-              <ma14:wrappingTextBoxFlag xmlns="" xmlns:ma14="http://schemas.microsoft.com/office/mac/drawingml/2011/main" val="1"/>
+              <ma14:wrappingTextBoxFlag xmlns:ma14="http://schemas.microsoft.com/office/mac/drawingml/2011/main" xmlns="" val="1"/>
             </a:ext>
           </a:extLst>
         </p:spPr>
@@ -811,7 +812,7 @@
           </a:ln>
           <a:extLst>
             <a:ext uri="{C572A759-6A51-4108-AA02-DFA0A04FC94B}">
-              <ma14:wrappingTextBoxFlag xmlns="" xmlns:ma14="http://schemas.microsoft.com/office/mac/drawingml/2011/main" val="1"/>
+              <ma14:wrappingTextBoxFlag xmlns:ma14="http://schemas.microsoft.com/office/mac/drawingml/2011/main" xmlns="" val="1"/>
             </a:ext>
           </a:extLst>
         </p:spPr>
@@ -2043,7 +2044,8 @@
           <a:lstStyle/>
           <a:p>
             <a:r>
-              <a:t>Tuning (the beast)</a:t>
+              <a:rPr dirty="0"/>
+              <a:t>Tuning</a:t>
             </a:r>
           </a:p>
         </p:txBody>
@@ -2071,20 +2073,19 @@
           <a:bodyPr/>
           <a:lstStyle/>
           <a:p>
-            <a:pPr marL="0">
-              <a:spcBef>
-                <a:spcPts val="0"/>
-              </a:spcBef>
-            </a:pPr>
-            <a:r>
-              <a:t>Vocal Processor Demonstration</a:t>
-            </a:r>
-          </a:p>
-          <a:p>
             <a:pPr marL="0"/>
             <a:r>
-              <a:t>The Challenge of Adding it to the Program</a:t>
+              <a:rPr lang="en-US" dirty="0"/>
+              <a:t>Brain Tuning Functionality</a:t>
             </a:r>
+          </a:p>
+          <a:p>
+            <a:pPr marL="0"/>
+            <a:r>
+              <a:rPr lang="en-US" dirty="0"/>
+              <a:t>Smart Play – Only One String at a Time</a:t>
+            </a:r>
+            <a:endParaRPr dirty="0"/>
           </a:p>
         </p:txBody>
       </p:sp>
@@ -2098,6 +2099,73 @@
 </file>
 
 <file path=ppt/slides/slide13.xml><?xml version="1.0" encoding="utf-8"?>
+<p:sld xmlns:a="http://schemas.openxmlformats.org/drawingml/2006/main" xmlns:r="http://schemas.openxmlformats.org/officeDocument/2006/relationships" xmlns:p="http://schemas.openxmlformats.org/presentationml/2006/main">
+  <p:cSld>
+    <p:spTree>
+      <p:nvGrpSpPr>
+        <p:cNvPr id="1" name=""/>
+        <p:cNvGrpSpPr/>
+        <p:nvPr/>
+      </p:nvGrpSpPr>
+      <p:grpSpPr>
+        <a:xfrm>
+          <a:off x="0" y="0"/>
+          <a:ext cx="0" cy="0"/>
+          <a:chOff x="0" y="0"/>
+          <a:chExt cx="0" cy="0"/>
+        </a:xfrm>
+      </p:grpSpPr>
+      <p:pic>
+        <p:nvPicPr>
+          <p:cNvPr id="5" name="Picture 4">
+            <a:extLst>
+              <a:ext uri="{FF2B5EF4-FFF2-40B4-BE49-F238E27FC236}">
+                <a16:creationId xmlns:a16="http://schemas.microsoft.com/office/drawing/2014/main" id="{AB7F688D-1AD7-4024-ACE2-590E4315CC6C}"/>
+              </a:ext>
+            </a:extLst>
+          </p:cNvPr>
+          <p:cNvPicPr>
+            <a:picLocks noChangeAspect="1"/>
+          </p:cNvPicPr>
+          <p:nvPr/>
+        </p:nvPicPr>
+        <p:blipFill>
+          <a:blip r:embed="rId2">
+            <a:extLst>
+              <a:ext uri="{28A0092B-C50C-407E-A947-70E740481C1C}">
+                <a14:useLocalDpi xmlns:a14="http://schemas.microsoft.com/office/drawing/2010/main" val="0"/>
+              </a:ext>
+            </a:extLst>
+          </a:blip>
+          <a:stretch>
+            <a:fillRect/>
+          </a:stretch>
+        </p:blipFill>
+        <p:spPr>
+          <a:xfrm>
+            <a:off x="4447945" y="494890"/>
+            <a:ext cx="3296110" cy="5868219"/>
+          </a:xfrm>
+          <a:prstGeom prst="rect">
+            <a:avLst/>
+          </a:prstGeom>
+        </p:spPr>
+      </p:pic>
+    </p:spTree>
+    <p:extLst>
+      <p:ext uri="{BB962C8B-B14F-4D97-AF65-F5344CB8AC3E}">
+        <p14:creationId xmlns:p14="http://schemas.microsoft.com/office/powerpoint/2010/main" val="1007412785"/>
+      </p:ext>
+    </p:extLst>
+  </p:cSld>
+  <p:clrMapOvr>
+    <a:masterClrMapping/>
+  </p:clrMapOvr>
+  <p:transition spd="med"/>
+</p:sld>
+</file>
+
+<file path=ppt/slides/slide14.xml><?xml version="1.0" encoding="utf-8"?>
 <p:sld xmlns:a="http://schemas.openxmlformats.org/drawingml/2006/main" xmlns:r="http://schemas.openxmlformats.org/officeDocument/2006/relationships" xmlns:p="http://schemas.openxmlformats.org/presentationml/2006/main">
   <p:cSld>
     <p:spTree>
@@ -2177,7 +2245,7 @@
 </p:sld>
 </file>
 
-<file path=ppt/slides/slide14.xml><?xml version="1.0" encoding="utf-8"?>
+<file path=ppt/slides/slide15.xml><?xml version="1.0" encoding="utf-8"?>
 <p:sld xmlns:a="http://schemas.openxmlformats.org/drawingml/2006/main" xmlns:r="http://schemas.openxmlformats.org/officeDocument/2006/relationships" xmlns:p="http://schemas.openxmlformats.org/presentationml/2006/main">
   <p:cSld>
     <p:spTree>

</xml_diff>